<commit_message>
Removing the animation, updating the figures
</commit_message>
<xml_diff>
--- a/Presentation/Proj4_presentation_v1.pptx
+++ b/Presentation/Proj4_presentation_v1.pptx
@@ -136,27 +136,6 @@
   <p188:author id="{0EC2D70F-E384-9803-E3F1-EF16A3855103}" name="Oliver King" initials="OK" userId="2f8be3b40744adfd" providerId="Windows Live"/>
   <p188:author id="{210206AB-430C-125E-3CF9-8271501E1E77}" name="Mohsen Farrokhrouz" initials="MF" userId="ad2061eca19da9a1" providerId="Windows Live"/>
 </p188:authorLst>
-</file>
-
-<file path=ppt/comments/modernComment_107_F23CEFE2.xml><?xml version="1.0" encoding="utf-8"?>
-<p188:cmLst xmlns:a="http://schemas.openxmlformats.org/drawingml/2006/main" xmlns:r="http://schemas.openxmlformats.org/officeDocument/2006/relationships" xmlns:p188="http://schemas.microsoft.com/office/powerpoint/2018/8/main">
-  <p188:cm id="{538CF4ED-AFB8-4E3A-9EBB-6442FFC3F3A4}" authorId="{423BBA03-47CF-A23B-0EAD-0C3C24D02891}" created="2023-06-18T11:58:56.042">
-    <pc:sldMkLst xmlns:pc="http://schemas.microsoft.com/office/powerpoint/2013/main/command">
-      <pc:docMk/>
-      <pc:sldMk cId="4064079842" sldId="263"/>
-    </pc:sldMkLst>
-    <p188:txBody>
-      <a:bodyPr/>
-      <a:lstStyle/>
-      <a:p>
-        <a:r>
-          <a:rPr lang="en-AU"/>
-          <a:t>Hide this slide</a:t>
-        </a:r>
-      </a:p>
-    </p188:txBody>
-  </p188:cm>
-</p188:cmLst>
 </file>
 
 <file path=ppt/comments/modernComment_109_D7CE0543.xml><?xml version="1.0" encoding="utf-8"?>
@@ -11921,7 +11900,7 @@
           <a:p>
             <a:fld id="{485A6EB2-FA01-4BFD-AAFB-A06C68F7E8CB}" type="datetimeFigureOut">
               <a:rPr lang="en-AU" smtClean="0"/>
-              <a:t>18/06/2023</a:t>
+              <a:t>19/06/2023</a:t>
             </a:fld>
             <a:endParaRPr lang="en-AU"/>
           </a:p>
@@ -12338,7 +12317,7 @@
           <a:p>
             <a:fld id="{520E703A-A14B-4DE5-A03C-A003D78AD194}" type="datetime1">
               <a:rPr lang="en-US" smtClean="0"/>
-              <a:t>6/18/2023</a:t>
+              <a:t>6/19/2023</a:t>
             </a:fld>
             <a:endParaRPr lang="en-US"/>
           </a:p>
@@ -12538,7 +12517,7 @@
           <a:p>
             <a:fld id="{73D8D68A-9EBE-4C58-A0CF-9A94687A3376}" type="datetime1">
               <a:rPr lang="en-US" smtClean="0"/>
-              <a:t>6/18/2023</a:t>
+              <a:t>6/19/2023</a:t>
             </a:fld>
             <a:endParaRPr lang="en-US"/>
           </a:p>
@@ -12748,7 +12727,7 @@
           <a:p>
             <a:fld id="{7B4A25C5-8483-46B4-8B64-03D8BB6EDD43}" type="datetime1">
               <a:rPr lang="en-US" smtClean="0"/>
-              <a:t>6/18/2023</a:t>
+              <a:t>6/19/2023</a:t>
             </a:fld>
             <a:endParaRPr lang="en-US"/>
           </a:p>
@@ -13211,7 +13190,7 @@
           <a:p>
             <a:fld id="{770AA5BA-DC1A-44D0-AEF4-00125352215D}" type="datetime1">
               <a:rPr lang="en-US" smtClean="0"/>
-              <a:t>6/18/2023</a:t>
+              <a:t>6/19/2023</a:t>
             </a:fld>
             <a:endParaRPr lang="en-US"/>
           </a:p>
@@ -13479,7 +13458,7 @@
           <a:p>
             <a:fld id="{2AB21B40-432C-4CD2-BDB9-F21B8E6039C6}" type="datetime1">
               <a:rPr lang="en-US" smtClean="0"/>
-              <a:t>6/18/2023</a:t>
+              <a:t>6/19/2023</a:t>
             </a:fld>
             <a:endParaRPr lang="en-US"/>
           </a:p>
@@ -13894,7 +13873,7 @@
           <a:p>
             <a:fld id="{5D6B19EF-D3DF-423D-B02F-A4992B6DF41D}" type="datetime1">
               <a:rPr lang="en-US" smtClean="0"/>
-              <a:t>6/18/2023</a:t>
+              <a:t>6/19/2023</a:t>
             </a:fld>
             <a:endParaRPr lang="en-US"/>
           </a:p>
@@ -14036,7 +14015,7 @@
           <a:p>
             <a:fld id="{840DB5C2-2B49-4D22-8F79-03C9DF57F18B}" type="datetime1">
               <a:rPr lang="en-US" smtClean="0"/>
-              <a:t>6/18/2023</a:t>
+              <a:t>6/19/2023</a:t>
             </a:fld>
             <a:endParaRPr lang="en-US"/>
           </a:p>
@@ -14149,7 +14128,7 @@
           <a:p>
             <a:fld id="{631DE7E8-C68D-4BD3-AB6A-F707AF362335}" type="datetime1">
               <a:rPr lang="en-US" smtClean="0"/>
-              <a:t>6/18/2023</a:t>
+              <a:t>6/19/2023</a:t>
             </a:fld>
             <a:endParaRPr lang="en-US"/>
           </a:p>
@@ -14462,7 +14441,7 @@
           <a:p>
             <a:fld id="{F9AC128F-B800-42E7-874E-2705FBAC753E}" type="datetime1">
               <a:rPr lang="en-US" smtClean="0"/>
-              <a:t>6/18/2023</a:t>
+              <a:t>6/19/2023</a:t>
             </a:fld>
             <a:endParaRPr lang="en-US"/>
           </a:p>
@@ -14751,7 +14730,7 @@
           <a:p>
             <a:fld id="{97C6F4EF-788B-474B-A7B4-C61B78D3DEEE}" type="datetime1">
               <a:rPr lang="en-US" smtClean="0"/>
-              <a:t>6/18/2023</a:t>
+              <a:t>6/19/2023</a:t>
             </a:fld>
             <a:endParaRPr lang="en-US"/>
           </a:p>
@@ -14994,7 +14973,7 @@
           <a:p>
             <a:fld id="{41359ADD-F6F9-41E2-B3AA-6E6D79540949}" type="datetime1">
               <a:rPr lang="en-US" smtClean="0"/>
-              <a:t>6/18/2023</a:t>
+              <a:t>6/19/2023</a:t>
             </a:fld>
             <a:endParaRPr lang="en-US"/>
           </a:p>
@@ -16318,7 +16297,7 @@
 </file>
 
 <file path=ppt/slides/slide10.xml><?xml version="1.0" encoding="utf-8"?>
-<p:sld xmlns:a="http://schemas.openxmlformats.org/drawingml/2006/main" xmlns:r="http://schemas.openxmlformats.org/officeDocument/2006/relationships" xmlns:p="http://schemas.openxmlformats.org/presentationml/2006/main">
+<p:sld xmlns:a="http://schemas.openxmlformats.org/drawingml/2006/main" xmlns:r="http://schemas.openxmlformats.org/officeDocument/2006/relationships" xmlns:p="http://schemas.openxmlformats.org/presentationml/2006/main" show="0">
   <p:cSld>
     <p:bg>
       <p:bgPr>
@@ -20253,10 +20232,10 @@
       </p:sp>
       <p:pic>
         <p:nvPicPr>
-          <p:cNvPr id="5" name="Picture 4" descr="A picture containing text, screenshot, font, plot&#10;&#10;Description automatically generated">
+          <p:cNvPr id="6" name="Picture 5" descr="A picture containing text, screenshot, font, plot&#10;&#10;Description automatically generated">
             <a:extLst>
               <a:ext uri="{FF2B5EF4-FFF2-40B4-BE49-F238E27FC236}">
-                <a16:creationId xmlns:a16="http://schemas.microsoft.com/office/drawing/2014/main" id="{91BA952B-84B9-4239-AB9E-B843D0CAD984}"/>
+                <a16:creationId xmlns:a16="http://schemas.microsoft.com/office/drawing/2014/main" id="{D4DDAAAA-5E77-62D6-D1E3-D21711C5A9B3}"/>
               </a:ext>
             </a:extLst>
           </p:cNvPr>
@@ -20273,8 +20252,8 @@
         </p:blipFill>
         <p:spPr>
           <a:xfrm>
-            <a:off x="130383" y="1559202"/>
-            <a:ext cx="5838902" cy="4306190"/>
+            <a:off x="248195" y="1609234"/>
+            <a:ext cx="5687579" cy="4160528"/>
           </a:xfrm>
           <a:prstGeom prst="rect">
             <a:avLst/>
@@ -20283,10 +20262,10 @@
       </p:pic>
       <p:pic>
         <p:nvPicPr>
-          <p:cNvPr id="8" name="Picture 7" descr="A picture containing text, screenshot, plot, font&#10;&#10;Description automatically generated">
+          <p:cNvPr id="9" name="Picture 8" descr="A picture containing text, screenshot, font, plot&#10;&#10;Description automatically generated">
             <a:extLst>
               <a:ext uri="{FF2B5EF4-FFF2-40B4-BE49-F238E27FC236}">
-                <a16:creationId xmlns:a16="http://schemas.microsoft.com/office/drawing/2014/main" id="{752BCE21-9D9A-4525-88E4-8D4D0AAA9F79}"/>
+                <a16:creationId xmlns:a16="http://schemas.microsoft.com/office/drawing/2014/main" id="{4068CF76-9063-972B-B481-D38D23D51B29}"/>
               </a:ext>
             </a:extLst>
           </p:cNvPr>
@@ -20303,8 +20282,8 @@
         </p:blipFill>
         <p:spPr>
           <a:xfrm>
-            <a:off x="6096000" y="1559201"/>
-            <a:ext cx="5932740" cy="4306189"/>
+            <a:off x="6096000" y="1609234"/>
+            <a:ext cx="5943612" cy="4160528"/>
           </a:xfrm>
           <a:prstGeom prst="rect">
             <a:avLst/>
@@ -22816,7 +22795,7 @@
 </file>
 
 <file path=ppt/slides/slide6.xml><?xml version="1.0" encoding="utf-8"?>
-<p:sld xmlns:a="http://schemas.openxmlformats.org/drawingml/2006/main" xmlns:r="http://schemas.openxmlformats.org/officeDocument/2006/relationships" xmlns:p="http://schemas.openxmlformats.org/presentationml/2006/main">
+<p:sld xmlns:a="http://schemas.openxmlformats.org/drawingml/2006/main" xmlns:r="http://schemas.openxmlformats.org/officeDocument/2006/relationships" xmlns:p="http://schemas.openxmlformats.org/presentationml/2006/main" show="0">
   <p:cSld>
     <p:spTree>
       <p:nvGrpSpPr>
@@ -22847,7 +22826,7 @@
           <p:nvPr/>
         </p:nvPicPr>
         <p:blipFill>
-          <a:blip r:embed="rId3"/>
+          <a:blip r:embed="rId2"/>
           <a:stretch>
             <a:fillRect/>
           </a:stretch>
@@ -23354,11 +23333,6 @@
   <p:clrMapOvr>
     <a:masterClrMapping/>
   </p:clrMapOvr>
-  <p:extLst>
-    <p:ext uri="{6950BFC3-D8DA-4A85-94F7-54DA5524770B}">
-      <p188:commentRel xmlns:p188="http://schemas.microsoft.com/office/powerpoint/2018/8/main" r:id="rId2"/>
-    </p:ext>
-  </p:extLst>
 </p:sld>
 </file>
 
@@ -24253,8 +24227,8 @@
         </p:nvSpPr>
         <p:spPr>
           <a:xfrm>
-            <a:off x="60278" y="464664"/>
-            <a:ext cx="6311704" cy="1103884"/>
+            <a:off x="60278" y="435300"/>
+            <a:ext cx="6311704" cy="725014"/>
           </a:xfrm>
         </p:spPr>
         <p:txBody>
@@ -24272,21 +24246,7 @@
                 <a:ea typeface="+mn-ea"/>
                 <a:cs typeface="+mn-cs"/>
               </a:rPr>
-              <a:t>Develop Interactive Dashboard (</a:t>
-            </a:r>
-            <a:r>
-              <a:rPr lang="en-US" sz="3600" b="1" dirty="0">
-                <a:ea typeface="+mn-ea"/>
-                <a:cs typeface="+mn-cs"/>
-              </a:rPr>
-              <a:t>Power BI</a:t>
-            </a:r>
-            <a:r>
-              <a:rPr lang="en-US" sz="3600" b="1" kern="1200" dirty="0">
-                <a:ea typeface="+mn-ea"/>
-                <a:cs typeface="+mn-cs"/>
-              </a:rPr>
-              <a:t>) </a:t>
+              <a:t>Visualization</a:t>
             </a:r>
             <a:endParaRPr lang="en-US" sz="3600" b="1" dirty="0"/>
           </a:p>
@@ -24473,8 +24433,8 @@
         </p:nvSpPr>
         <p:spPr>
           <a:xfrm>
-            <a:off x="6689188" y="2081467"/>
-            <a:ext cx="5356024" cy="3306064"/>
+            <a:off x="2011680" y="6013076"/>
+            <a:ext cx="1760401" cy="435243"/>
           </a:xfrm>
         </p:spPr>
         <p:txBody>
@@ -24483,37 +24443,18 @@
           </a:bodyPr>
           <a:lstStyle/>
           <a:p>
+            <a:pPr marL="0" indent="0">
+              <a:buNone/>
+            </a:pPr>
             <a:r>
-              <a:rPr lang="en-US" sz="1700" dirty="0"/>
-              <a:t>Purpose of dashboard (what does it tell user).</a:t>
-            </a:r>
-          </a:p>
-          <a:p>
-            <a:r>
-              <a:rPr lang="en-US" sz="1700" dirty="0"/>
-              <a:t>Click </a:t>
+              <a:rPr lang="en-US" sz="2000" b="1" dirty="0" err="1">
+                <a:hlinkClick r:id="rId4"/>
+              </a:rPr>
+              <a:t>PowerBI</a:t>
             </a:r>
             <a:r>
-              <a:rPr lang="en-US" sz="1700" dirty="0">
-                <a:hlinkClick r:id="rId4"/>
-              </a:rPr>
-              <a:t>here</a:t>
-            </a:r>
-            <a:r>
-              <a:rPr lang="en-US" sz="1700" dirty="0"/>
+              <a:rPr lang="en-US" sz="2000" b="1" dirty="0"/>
               <a:t> </a:t>
-            </a:r>
-          </a:p>
-          <a:p>
-            <a:r>
-              <a:rPr lang="en-US" sz="1700" dirty="0"/>
-              <a:t>Use of the map layers, filters, new measures, combined charts.</a:t>
-            </a:r>
-          </a:p>
-          <a:p>
-            <a:r>
-              <a:rPr lang="en-US" sz="1700" dirty="0"/>
-              <a:t>Multiple data sources used and creating the relationship between each.</a:t>
             </a:r>
           </a:p>
           <a:p>
@@ -24576,7 +24517,7 @@
         </p:blipFill>
         <p:spPr>
           <a:xfrm>
-            <a:off x="60278" y="2081467"/>
+            <a:off x="-38198" y="2081467"/>
             <a:ext cx="6096001" cy="3418115"/>
           </a:xfrm>
           <a:prstGeom prst="rect">
@@ -24584,6 +24525,251 @@
           </a:prstGeom>
         </p:spPr>
       </p:pic>
+      <p:pic>
+        <p:nvPicPr>
+          <p:cNvPr id="4" name="Picture 3" descr="A picture containing text, diagram, screenshot, plot&#10;&#10;Description automatically generated">
+            <a:extLst>
+              <a:ext uri="{FF2B5EF4-FFF2-40B4-BE49-F238E27FC236}">
+                <a16:creationId xmlns:a16="http://schemas.microsoft.com/office/drawing/2014/main" id="{E1411927-FEAC-2889-C85E-134E75186C29}"/>
+              </a:ext>
+            </a:extLst>
+          </p:cNvPr>
+          <p:cNvPicPr>
+            <a:picLocks noChangeAspect="1"/>
+          </p:cNvPicPr>
+          <p:nvPr/>
+        </p:nvPicPr>
+        <p:blipFill>
+          <a:blip r:embed="rId6"/>
+          <a:stretch>
+            <a:fillRect/>
+          </a:stretch>
+        </p:blipFill>
+        <p:spPr>
+          <a:xfrm>
+            <a:off x="6314401" y="2081467"/>
+            <a:ext cx="5657205" cy="3453556"/>
+          </a:xfrm>
+          <a:prstGeom prst="rect">
+            <a:avLst/>
+          </a:prstGeom>
+        </p:spPr>
+      </p:pic>
+      <p:sp>
+        <p:nvSpPr>
+          <p:cNvPr id="5" name="Content Placeholder 2">
+            <a:extLst>
+              <a:ext uri="{FF2B5EF4-FFF2-40B4-BE49-F238E27FC236}">
+                <a16:creationId xmlns:a16="http://schemas.microsoft.com/office/drawing/2014/main" id="{7D8A76D3-22F6-2FCA-CF3E-BA257EE61AC8}"/>
+              </a:ext>
+            </a:extLst>
+          </p:cNvPr>
+          <p:cNvSpPr txBox="1">
+            <a:spLocks/>
+          </p:cNvSpPr>
+          <p:nvPr/>
+        </p:nvSpPr>
+        <p:spPr>
+          <a:xfrm>
+            <a:off x="8453343" y="5897036"/>
+            <a:ext cx="1760401" cy="435243"/>
+          </a:xfrm>
+          <a:prstGeom prst="rect">
+            <a:avLst/>
+          </a:prstGeom>
+        </p:spPr>
+        <p:txBody>
+          <a:bodyPr vert="horz" lIns="91440" tIns="45720" rIns="91440" bIns="45720" rtlCol="0" anchor="t">
+            <a:normAutofit/>
+          </a:bodyPr>
+          <a:lstStyle>
+            <a:lvl1pPr marL="228600" indent="-228600" algn="l" defTabSz="914400" rtl="0" eaLnBrk="1" latinLnBrk="0" hangingPunct="1">
+              <a:lnSpc>
+                <a:spcPct val="90000"/>
+              </a:lnSpc>
+              <a:spcBef>
+                <a:spcPts val="1000"/>
+              </a:spcBef>
+              <a:buFont typeface="Arial" panose="020B0604020202020204" pitchFamily="34" charset="0"/>
+              <a:buChar char="•"/>
+              <a:defRPr sz="2800" kern="1200">
+                <a:solidFill>
+                  <a:schemeClr val="tx1"/>
+                </a:solidFill>
+                <a:latin typeface="+mn-lt"/>
+                <a:ea typeface="+mn-ea"/>
+                <a:cs typeface="+mn-cs"/>
+              </a:defRPr>
+            </a:lvl1pPr>
+            <a:lvl2pPr marL="685800" indent="-228600" algn="l" defTabSz="914400" rtl="0" eaLnBrk="1" latinLnBrk="0" hangingPunct="1">
+              <a:lnSpc>
+                <a:spcPct val="90000"/>
+              </a:lnSpc>
+              <a:spcBef>
+                <a:spcPts val="500"/>
+              </a:spcBef>
+              <a:buFont typeface="Arial" panose="020B0604020202020204" pitchFamily="34" charset="0"/>
+              <a:buChar char="•"/>
+              <a:defRPr sz="2400" kern="1200">
+                <a:solidFill>
+                  <a:schemeClr val="tx1"/>
+                </a:solidFill>
+                <a:latin typeface="+mn-lt"/>
+                <a:ea typeface="+mn-ea"/>
+                <a:cs typeface="+mn-cs"/>
+              </a:defRPr>
+            </a:lvl2pPr>
+            <a:lvl3pPr marL="1143000" indent="-228600" algn="l" defTabSz="914400" rtl="0" eaLnBrk="1" latinLnBrk="0" hangingPunct="1">
+              <a:lnSpc>
+                <a:spcPct val="90000"/>
+              </a:lnSpc>
+              <a:spcBef>
+                <a:spcPts val="500"/>
+              </a:spcBef>
+              <a:buFont typeface="Arial" panose="020B0604020202020204" pitchFamily="34" charset="0"/>
+              <a:buChar char="•"/>
+              <a:defRPr sz="2000" kern="1200">
+                <a:solidFill>
+                  <a:schemeClr val="tx1"/>
+                </a:solidFill>
+                <a:latin typeface="+mn-lt"/>
+                <a:ea typeface="+mn-ea"/>
+                <a:cs typeface="+mn-cs"/>
+              </a:defRPr>
+            </a:lvl3pPr>
+            <a:lvl4pPr marL="1600200" indent="-228600" algn="l" defTabSz="914400" rtl="0" eaLnBrk="1" latinLnBrk="0" hangingPunct="1">
+              <a:lnSpc>
+                <a:spcPct val="90000"/>
+              </a:lnSpc>
+              <a:spcBef>
+                <a:spcPts val="500"/>
+              </a:spcBef>
+              <a:buFont typeface="Arial" panose="020B0604020202020204" pitchFamily="34" charset="0"/>
+              <a:buChar char="•"/>
+              <a:defRPr sz="1800" kern="1200">
+                <a:solidFill>
+                  <a:schemeClr val="tx1"/>
+                </a:solidFill>
+                <a:latin typeface="+mn-lt"/>
+                <a:ea typeface="+mn-ea"/>
+                <a:cs typeface="+mn-cs"/>
+              </a:defRPr>
+            </a:lvl4pPr>
+            <a:lvl5pPr marL="2057400" indent="-228600" algn="l" defTabSz="914400" rtl="0" eaLnBrk="1" latinLnBrk="0" hangingPunct="1">
+              <a:lnSpc>
+                <a:spcPct val="90000"/>
+              </a:lnSpc>
+              <a:spcBef>
+                <a:spcPts val="500"/>
+              </a:spcBef>
+              <a:buFont typeface="Arial" panose="020B0604020202020204" pitchFamily="34" charset="0"/>
+              <a:buChar char="•"/>
+              <a:defRPr sz="1800" kern="1200">
+                <a:solidFill>
+                  <a:schemeClr val="tx1"/>
+                </a:solidFill>
+                <a:latin typeface="+mn-lt"/>
+                <a:ea typeface="+mn-ea"/>
+                <a:cs typeface="+mn-cs"/>
+              </a:defRPr>
+            </a:lvl5pPr>
+            <a:lvl6pPr marL="2514600" indent="-228600" algn="l" defTabSz="914400" rtl="0" eaLnBrk="1" latinLnBrk="0" hangingPunct="1">
+              <a:lnSpc>
+                <a:spcPct val="90000"/>
+              </a:lnSpc>
+              <a:spcBef>
+                <a:spcPts val="500"/>
+              </a:spcBef>
+              <a:buFont typeface="Arial" panose="020B0604020202020204" pitchFamily="34" charset="0"/>
+              <a:buChar char="•"/>
+              <a:defRPr sz="1800" kern="1200">
+                <a:solidFill>
+                  <a:schemeClr val="tx1"/>
+                </a:solidFill>
+                <a:latin typeface="+mn-lt"/>
+                <a:ea typeface="+mn-ea"/>
+                <a:cs typeface="+mn-cs"/>
+              </a:defRPr>
+            </a:lvl6pPr>
+            <a:lvl7pPr marL="2971800" indent="-228600" algn="l" defTabSz="914400" rtl="0" eaLnBrk="1" latinLnBrk="0" hangingPunct="1">
+              <a:lnSpc>
+                <a:spcPct val="90000"/>
+              </a:lnSpc>
+              <a:spcBef>
+                <a:spcPts val="500"/>
+              </a:spcBef>
+              <a:buFont typeface="Arial" panose="020B0604020202020204" pitchFamily="34" charset="0"/>
+              <a:buChar char="•"/>
+              <a:defRPr sz="1800" kern="1200">
+                <a:solidFill>
+                  <a:schemeClr val="tx1"/>
+                </a:solidFill>
+                <a:latin typeface="+mn-lt"/>
+                <a:ea typeface="+mn-ea"/>
+                <a:cs typeface="+mn-cs"/>
+              </a:defRPr>
+            </a:lvl7pPr>
+            <a:lvl8pPr marL="3429000" indent="-228600" algn="l" defTabSz="914400" rtl="0" eaLnBrk="1" latinLnBrk="0" hangingPunct="1">
+              <a:lnSpc>
+                <a:spcPct val="90000"/>
+              </a:lnSpc>
+              <a:spcBef>
+                <a:spcPts val="500"/>
+              </a:spcBef>
+              <a:buFont typeface="Arial" panose="020B0604020202020204" pitchFamily="34" charset="0"/>
+              <a:buChar char="•"/>
+              <a:defRPr sz="1800" kern="1200">
+                <a:solidFill>
+                  <a:schemeClr val="tx1"/>
+                </a:solidFill>
+                <a:latin typeface="+mn-lt"/>
+                <a:ea typeface="+mn-ea"/>
+                <a:cs typeface="+mn-cs"/>
+              </a:defRPr>
+            </a:lvl8pPr>
+            <a:lvl9pPr marL="3886200" indent="-228600" algn="l" defTabSz="914400" rtl="0" eaLnBrk="1" latinLnBrk="0" hangingPunct="1">
+              <a:lnSpc>
+                <a:spcPct val="90000"/>
+              </a:lnSpc>
+              <a:spcBef>
+                <a:spcPts val="500"/>
+              </a:spcBef>
+              <a:buFont typeface="Arial" panose="020B0604020202020204" pitchFamily="34" charset="0"/>
+              <a:buChar char="•"/>
+              <a:defRPr sz="1800" kern="1200">
+                <a:solidFill>
+                  <a:schemeClr val="tx1"/>
+                </a:solidFill>
+                <a:latin typeface="+mn-lt"/>
+                <a:ea typeface="+mn-ea"/>
+                <a:cs typeface="+mn-cs"/>
+              </a:defRPr>
+            </a:lvl9pPr>
+          </a:lstStyle>
+          <a:p>
+            <a:pPr marL="0" indent="0">
+              <a:buFont typeface="Arial" panose="020B0604020202020204" pitchFamily="34" charset="0"/>
+              <a:buNone/>
+            </a:pPr>
+            <a:r>
+              <a:rPr lang="en-US" sz="2000" b="1" dirty="0">
+                <a:hlinkClick r:id="rId7"/>
+              </a:rPr>
+              <a:t>Tableau</a:t>
+            </a:r>
+            <a:r>
+              <a:rPr lang="en-US" sz="2000" b="1" dirty="0"/>
+              <a:t> </a:t>
+            </a:r>
+          </a:p>
+          <a:p>
+            <a:endParaRPr lang="en-US" sz="1700" dirty="0"/>
+          </a:p>
+          <a:p>
+            <a:endParaRPr lang="en-US" sz="1700" dirty="0"/>
+          </a:p>
+        </p:txBody>
+      </p:sp>
     </p:spTree>
     <p:extLst>
       <p:ext uri="{BB962C8B-B14F-4D97-AF65-F5344CB8AC3E}">
@@ -24594,329 +24780,6 @@
   <p:clrMapOvr>
     <a:masterClrMapping/>
   </p:clrMapOvr>
-  <p:timing>
-    <p:tnLst>
-      <p:par>
-        <p:cTn id="1" dur="indefinite" restart="never" nodeType="tmRoot">
-          <p:childTnLst>
-            <p:seq concurrent="1" nextAc="seek">
-              <p:cTn id="2" dur="indefinite" nodeType="mainSeq">
-                <p:childTnLst>
-                  <p:par>
-                    <p:cTn id="3" fill="hold">
-                      <p:stCondLst>
-                        <p:cond delay="indefinite"/>
-                      </p:stCondLst>
-                      <p:childTnLst>
-                        <p:par>
-                          <p:cTn id="4" fill="hold">
-                            <p:stCondLst>
-                              <p:cond delay="0"/>
-                            </p:stCondLst>
-                            <p:childTnLst>
-                              <p:par>
-                                <p:cTn id="5" presetID="1" presetClass="entr" presetSubtype="0" fill="hold" grpId="0" nodeType="clickEffect">
-                                  <p:stCondLst>
-                                    <p:cond delay="0"/>
-                                  </p:stCondLst>
-                                  <p:childTnLst>
-                                    <p:set>
-                                      <p:cBhvr>
-                                        <p:cTn id="6" dur="1" fill="hold">
-                                          <p:stCondLst>
-                                            <p:cond delay="0"/>
-                                          </p:stCondLst>
-                                        </p:cTn>
-                                        <p:tgtEl>
-                                          <p:spTgt spid="2"/>
-                                        </p:tgtEl>
-                                        <p:attrNameLst>
-                                          <p:attrName>style.visibility</p:attrName>
-                                        </p:attrNameLst>
-                                      </p:cBhvr>
-                                      <p:to>
-                                        <p:strVal val="visible"/>
-                                      </p:to>
-                                    </p:set>
-                                  </p:childTnLst>
-                                </p:cTn>
-                              </p:par>
-                            </p:childTnLst>
-                          </p:cTn>
-                        </p:par>
-                      </p:childTnLst>
-                    </p:cTn>
-                  </p:par>
-                  <p:par>
-                    <p:cTn id="7" fill="hold">
-                      <p:stCondLst>
-                        <p:cond delay="indefinite"/>
-                      </p:stCondLst>
-                      <p:childTnLst>
-                        <p:par>
-                          <p:cTn id="8" fill="hold">
-                            <p:stCondLst>
-                              <p:cond delay="0"/>
-                            </p:stCondLst>
-                            <p:childTnLst>
-                              <p:par>
-                                <p:cTn id="9" presetID="10" presetClass="entr" presetSubtype="0" fill="hold" grpId="0" nodeType="clickEffect">
-                                  <p:stCondLst>
-                                    <p:cond delay="0"/>
-                                  </p:stCondLst>
-                                  <p:childTnLst>
-                                    <p:set>
-                                      <p:cBhvr>
-                                        <p:cTn id="10" dur="1" fill="hold">
-                                          <p:stCondLst>
-                                            <p:cond delay="0"/>
-                                          </p:stCondLst>
-                                        </p:cTn>
-                                        <p:tgtEl>
-                                          <p:spTgt spid="3">
-                                            <p:txEl>
-                                              <p:pRg st="0" end="0"/>
-                                            </p:txEl>
-                                          </p:spTgt>
-                                        </p:tgtEl>
-                                        <p:attrNameLst>
-                                          <p:attrName>style.visibility</p:attrName>
-                                        </p:attrNameLst>
-                                      </p:cBhvr>
-                                      <p:to>
-                                        <p:strVal val="visible"/>
-                                      </p:to>
-                                    </p:set>
-                                    <p:animEffect transition="in" filter="fade">
-                                      <p:cBhvr>
-                                        <p:cTn id="11" dur="500"/>
-                                        <p:tgtEl>
-                                          <p:spTgt spid="3">
-                                            <p:txEl>
-                                              <p:pRg st="0" end="0"/>
-                                            </p:txEl>
-                                          </p:spTgt>
-                                        </p:tgtEl>
-                                      </p:cBhvr>
-                                    </p:animEffect>
-                                  </p:childTnLst>
-                                </p:cTn>
-                              </p:par>
-                            </p:childTnLst>
-                          </p:cTn>
-                        </p:par>
-                      </p:childTnLst>
-                    </p:cTn>
-                  </p:par>
-                  <p:par>
-                    <p:cTn id="12" fill="hold">
-                      <p:stCondLst>
-                        <p:cond delay="indefinite"/>
-                      </p:stCondLst>
-                      <p:childTnLst>
-                        <p:par>
-                          <p:cTn id="13" fill="hold">
-                            <p:stCondLst>
-                              <p:cond delay="0"/>
-                            </p:stCondLst>
-                            <p:childTnLst>
-                              <p:par>
-                                <p:cTn id="14" presetID="10" presetClass="entr" presetSubtype="0" fill="hold" grpId="0" nodeType="clickEffect">
-                                  <p:stCondLst>
-                                    <p:cond delay="0"/>
-                                  </p:stCondLst>
-                                  <p:childTnLst>
-                                    <p:set>
-                                      <p:cBhvr>
-                                        <p:cTn id="15" dur="1" fill="hold">
-                                          <p:stCondLst>
-                                            <p:cond delay="0"/>
-                                          </p:stCondLst>
-                                        </p:cTn>
-                                        <p:tgtEl>
-                                          <p:spTgt spid="3">
-                                            <p:txEl>
-                                              <p:pRg st="1" end="1"/>
-                                            </p:txEl>
-                                          </p:spTgt>
-                                        </p:tgtEl>
-                                        <p:attrNameLst>
-                                          <p:attrName>style.visibility</p:attrName>
-                                        </p:attrNameLst>
-                                      </p:cBhvr>
-                                      <p:to>
-                                        <p:strVal val="visible"/>
-                                      </p:to>
-                                    </p:set>
-                                    <p:animEffect transition="in" filter="fade">
-                                      <p:cBhvr>
-                                        <p:cTn id="16" dur="500"/>
-                                        <p:tgtEl>
-                                          <p:spTgt spid="3">
-                                            <p:txEl>
-                                              <p:pRg st="1" end="1"/>
-                                            </p:txEl>
-                                          </p:spTgt>
-                                        </p:tgtEl>
-                                      </p:cBhvr>
-                                    </p:animEffect>
-                                  </p:childTnLst>
-                                </p:cTn>
-                              </p:par>
-                            </p:childTnLst>
-                          </p:cTn>
-                        </p:par>
-                      </p:childTnLst>
-                    </p:cTn>
-                  </p:par>
-                  <p:par>
-                    <p:cTn id="17" fill="hold">
-                      <p:stCondLst>
-                        <p:cond delay="indefinite"/>
-                      </p:stCondLst>
-                      <p:childTnLst>
-                        <p:par>
-                          <p:cTn id="18" fill="hold">
-                            <p:stCondLst>
-                              <p:cond delay="0"/>
-                            </p:stCondLst>
-                            <p:childTnLst>
-                              <p:par>
-                                <p:cTn id="19" presetID="10" presetClass="entr" presetSubtype="0" fill="hold" grpId="0" nodeType="clickEffect">
-                                  <p:stCondLst>
-                                    <p:cond delay="0"/>
-                                  </p:stCondLst>
-                                  <p:childTnLst>
-                                    <p:set>
-                                      <p:cBhvr>
-                                        <p:cTn id="20" dur="1" fill="hold">
-                                          <p:stCondLst>
-                                            <p:cond delay="0"/>
-                                          </p:stCondLst>
-                                        </p:cTn>
-                                        <p:tgtEl>
-                                          <p:spTgt spid="3">
-                                            <p:txEl>
-                                              <p:pRg st="2" end="2"/>
-                                            </p:txEl>
-                                          </p:spTgt>
-                                        </p:tgtEl>
-                                        <p:attrNameLst>
-                                          <p:attrName>style.visibility</p:attrName>
-                                        </p:attrNameLst>
-                                      </p:cBhvr>
-                                      <p:to>
-                                        <p:strVal val="visible"/>
-                                      </p:to>
-                                    </p:set>
-                                    <p:animEffect transition="in" filter="fade">
-                                      <p:cBhvr>
-                                        <p:cTn id="21" dur="500"/>
-                                        <p:tgtEl>
-                                          <p:spTgt spid="3">
-                                            <p:txEl>
-                                              <p:pRg st="2" end="2"/>
-                                            </p:txEl>
-                                          </p:spTgt>
-                                        </p:tgtEl>
-                                      </p:cBhvr>
-                                    </p:animEffect>
-                                  </p:childTnLst>
-                                </p:cTn>
-                              </p:par>
-                            </p:childTnLst>
-                          </p:cTn>
-                        </p:par>
-                      </p:childTnLst>
-                    </p:cTn>
-                  </p:par>
-                  <p:par>
-                    <p:cTn id="22" fill="hold">
-                      <p:stCondLst>
-                        <p:cond delay="indefinite"/>
-                      </p:stCondLst>
-                      <p:childTnLst>
-                        <p:par>
-                          <p:cTn id="23" fill="hold">
-                            <p:stCondLst>
-                              <p:cond delay="0"/>
-                            </p:stCondLst>
-                            <p:childTnLst>
-                              <p:par>
-                                <p:cTn id="24" presetID="10" presetClass="entr" presetSubtype="0" fill="hold" grpId="0" nodeType="clickEffect">
-                                  <p:stCondLst>
-                                    <p:cond delay="0"/>
-                                  </p:stCondLst>
-                                  <p:childTnLst>
-                                    <p:set>
-                                      <p:cBhvr>
-                                        <p:cTn id="25" dur="1" fill="hold">
-                                          <p:stCondLst>
-                                            <p:cond delay="0"/>
-                                          </p:stCondLst>
-                                        </p:cTn>
-                                        <p:tgtEl>
-                                          <p:spTgt spid="3">
-                                            <p:txEl>
-                                              <p:pRg st="3" end="3"/>
-                                            </p:txEl>
-                                          </p:spTgt>
-                                        </p:tgtEl>
-                                        <p:attrNameLst>
-                                          <p:attrName>style.visibility</p:attrName>
-                                        </p:attrNameLst>
-                                      </p:cBhvr>
-                                      <p:to>
-                                        <p:strVal val="visible"/>
-                                      </p:to>
-                                    </p:set>
-                                    <p:animEffect transition="in" filter="fade">
-                                      <p:cBhvr>
-                                        <p:cTn id="26" dur="500"/>
-                                        <p:tgtEl>
-                                          <p:spTgt spid="3">
-                                            <p:txEl>
-                                              <p:pRg st="3" end="3"/>
-                                            </p:txEl>
-                                          </p:spTgt>
-                                        </p:tgtEl>
-                                      </p:cBhvr>
-                                    </p:animEffect>
-                                  </p:childTnLst>
-                                </p:cTn>
-                              </p:par>
-                            </p:childTnLst>
-                          </p:cTn>
-                        </p:par>
-                      </p:childTnLst>
-                    </p:cTn>
-                  </p:par>
-                </p:childTnLst>
-              </p:cTn>
-              <p:prevCondLst>
-                <p:cond evt="onPrev" delay="0">
-                  <p:tgtEl>
-                    <p:sldTgt/>
-                  </p:tgtEl>
-                </p:cond>
-              </p:prevCondLst>
-              <p:nextCondLst>
-                <p:cond evt="onNext" delay="0">
-                  <p:tgtEl>
-                    <p:sldTgt/>
-                  </p:tgtEl>
-                </p:cond>
-              </p:nextCondLst>
-            </p:seq>
-          </p:childTnLst>
-        </p:cTn>
-      </p:par>
-    </p:tnLst>
-    <p:bldLst>
-      <p:bldP spid="2" grpId="0"/>
-      <p:bldP spid="3" grpId="0" build="p"/>
-    </p:bldLst>
-  </p:timing>
   <p:extLst>
     <p:ext uri="{6950BFC3-D8DA-4A85-94F7-54DA5524770B}">
       <p188:commentRel xmlns:p188="http://schemas.microsoft.com/office/powerpoint/2018/8/main" r:id="rId2"/>

</xml_diff>